<commit_message>
Update the title and favicon for html page
</commit_message>
<xml_diff>
--- a/PS02/Final Project-VisualTech.pptx
+++ b/PS02/Final Project-VisualTech.pptx
@@ -115,6 +115,9 @@
   <p:extLst>
     <p:ext uri="{EFAFB233-063F-42B5-8137-9DF3F51BA10A}">
       <p15:sldGuideLst xmlns:p15="http://schemas.microsoft.com/office/powerpoint/2012/main"/>
+    </p:ext>
+    <p:ext uri="{2D200454-40CA-4A62-9FC3-DE9A4176ACB9}">
+      <p15:notesGuideLst xmlns:p15="http://schemas.microsoft.com/office/powerpoint/2012/main"/>
     </p:ext>
   </p:extLst>
 </p:presentation>
@@ -3800,14 +3803,6 @@
               </a:rPr>
               <a:t>12/12/2017</a:t>
             </a:r>
-            <a:endParaRPr lang="en-US" altLang="zh-CN" sz="1600" dirty="0" smtClean="0">
-              <a:solidFill>
-                <a:schemeClr val="bg1"/>
-              </a:solidFill>
-              <a:latin typeface="Abadi MT Condensed Extra Bold" charset="0"/>
-              <a:ea typeface="Abadi MT Condensed Extra Bold" charset="0"/>
-              <a:cs typeface="Abadi MT Condensed Extra Bold" charset="0"/>
-            </a:endParaRPr>
           </a:p>
           <a:p>
             <a:endParaRPr lang="en-US" sz="1600" dirty="0">
@@ -4857,7 +4852,7 @@
           </a:lstStyle>
           <a:p>
             <a:r>
-              <a:rPr lang="en-US" altLang="zh-CN" sz="1200" smtClean="0">
+              <a:rPr lang="en-US" altLang="zh-CN" sz="1200" dirty="0" smtClean="0">
                 <a:solidFill>
                   <a:schemeClr val="accent1">
                     <a:lumMod val="50000"/>
@@ -4868,35 +4863,7 @@
                 <a:cs typeface="Abadi MT Condensed Extra Bold" charset="0"/>
                 <a:hlinkClick r:id="rId6"/>
               </a:rPr>
-              <a:t>Link address</a:t>
-            </a:r>
-            <a:r>
-              <a:rPr lang="en-US" altLang="zh-CN" sz="1200" smtClean="0">
-                <a:solidFill>
-                  <a:schemeClr val="accent1">
-                    <a:lumMod val="50000"/>
-                  </a:schemeClr>
-                </a:solidFill>
-                <a:latin typeface="Abadi MT Condensed Extra Bold" charset="0"/>
-                <a:ea typeface="Abadi MT Condensed Extra Bold" charset="0"/>
-                <a:cs typeface="Abadi MT Condensed Extra Bold" charset="0"/>
-                <a:hlinkClick r:id="rId6"/>
-              </a:rPr>
-              <a:t> </a:t>
-            </a:r>
-            <a:r>
-              <a:rPr lang="en-US" altLang="zh-CN" sz="1200" dirty="0" smtClean="0">
-                <a:solidFill>
-                  <a:schemeClr val="accent1">
-                    <a:lumMod val="50000"/>
-                  </a:schemeClr>
-                </a:solidFill>
-                <a:latin typeface="Abadi MT Condensed Extra Bold" charset="0"/>
-                <a:ea typeface="Abadi MT Condensed Extra Bold" charset="0"/>
-                <a:cs typeface="Abadi MT Condensed Extra Bold" charset="0"/>
-                <a:hlinkClick r:id="rId6"/>
-              </a:rPr>
-              <a:t>for the website</a:t>
+              <a:t>Link address for the website</a:t>
             </a:r>
             <a:endParaRPr lang="en-US" sz="1200" dirty="0">
               <a:solidFill>
@@ -4998,7 +4965,7 @@
         </p:spPr>
         <p:txBody>
           <a:bodyPr vert="horz" lIns="91440" tIns="45720" rIns="91440" bIns="45720" rtlCol="0" anchor="ctr">
-            <a:normAutofit lnSpcReduction="10000"/>
+            <a:normAutofit/>
           </a:bodyPr>
           <a:lstStyle>
             <a:lvl1pPr algn="l" defTabSz="914400" rtl="0" eaLnBrk="1" latinLnBrk="0" hangingPunct="1">
@@ -7168,7 +7135,7 @@
               <a:buChar char="•"/>
             </a:pPr>
             <a:r>
-              <a:rPr lang="en-US" altLang="zh-CN" sz="1600" dirty="0">
+              <a:rPr lang="en-US" altLang="zh-CN" sz="1600" dirty="0" smtClean="0">
                 <a:solidFill>
                   <a:schemeClr val="accent1">
                     <a:lumMod val="50000"/>
@@ -7181,20 +7148,20 @@
               <a:t>Zoom</a:t>
             </a:r>
             <a:r>
-              <a:rPr lang="zh-CN" altLang="en-US" sz="1600" dirty="0">
-                <a:solidFill>
-                  <a:schemeClr val="accent1">
-                    <a:lumMod val="50000"/>
-                  </a:schemeClr>
-                </a:solidFill>
-                <a:latin typeface="Abadi MT Condensed Light" charset="0"/>
-                <a:ea typeface="Abadi MT Condensed Light" charset="0"/>
-                <a:cs typeface="Abadi MT Condensed Light" charset="0"/>
-              </a:rPr>
-              <a:t> </a:t>
-            </a:r>
-            <a:r>
-              <a:rPr lang="en-US" altLang="zh-CN" sz="1600" dirty="0">
+              <a:rPr lang="zh-CN" altLang="en-US" sz="1600" dirty="0" smtClean="0">
+                <a:solidFill>
+                  <a:schemeClr val="accent1">
+                    <a:lumMod val="50000"/>
+                  </a:schemeClr>
+                </a:solidFill>
+                <a:latin typeface="Abadi MT Condensed Light" charset="0"/>
+                <a:ea typeface="Abadi MT Condensed Light" charset="0"/>
+                <a:cs typeface="Abadi MT Condensed Light" charset="0"/>
+              </a:rPr>
+              <a:t> </a:t>
+            </a:r>
+            <a:r>
+              <a:rPr lang="en-US" altLang="zh-CN" sz="1600" dirty="0" smtClean="0">
                 <a:solidFill>
                   <a:schemeClr val="accent1">
                     <a:lumMod val="50000"/>
@@ -7207,20 +7174,20 @@
               <a:t>in</a:t>
             </a:r>
             <a:r>
-              <a:rPr lang="zh-CN" altLang="en-US" sz="1600" dirty="0">
-                <a:solidFill>
-                  <a:schemeClr val="accent1">
-                    <a:lumMod val="50000"/>
-                  </a:schemeClr>
-                </a:solidFill>
-                <a:latin typeface="Abadi MT Condensed Light" charset="0"/>
-                <a:ea typeface="Abadi MT Condensed Light" charset="0"/>
-                <a:cs typeface="Abadi MT Condensed Light" charset="0"/>
-              </a:rPr>
-              <a:t> </a:t>
-            </a:r>
-            <a:r>
-              <a:rPr lang="en-US" altLang="zh-CN" sz="1600" dirty="0">
+              <a:rPr lang="zh-CN" altLang="en-US" sz="1600" dirty="0" smtClean="0">
+                <a:solidFill>
+                  <a:schemeClr val="accent1">
+                    <a:lumMod val="50000"/>
+                  </a:schemeClr>
+                </a:solidFill>
+                <a:latin typeface="Abadi MT Condensed Light" charset="0"/>
+                <a:ea typeface="Abadi MT Condensed Light" charset="0"/>
+                <a:cs typeface="Abadi MT Condensed Light" charset="0"/>
+              </a:rPr>
+              <a:t> </a:t>
+            </a:r>
+            <a:r>
+              <a:rPr lang="en-US" altLang="zh-CN" sz="1600" dirty="0" smtClean="0">
                 <a:solidFill>
                   <a:schemeClr val="accent1">
                     <a:lumMod val="50000"/>
@@ -7233,20 +7200,20 @@
               <a:t>function</a:t>
             </a:r>
             <a:r>
-              <a:rPr lang="zh-CN" altLang="en-US" sz="1600" dirty="0">
-                <a:solidFill>
-                  <a:schemeClr val="accent1">
-                    <a:lumMod val="50000"/>
-                  </a:schemeClr>
-                </a:solidFill>
-                <a:latin typeface="Abadi MT Condensed Light" charset="0"/>
-                <a:ea typeface="Abadi MT Condensed Light" charset="0"/>
-                <a:cs typeface="Abadi MT Condensed Light" charset="0"/>
-              </a:rPr>
-              <a:t> </a:t>
-            </a:r>
-            <a:r>
-              <a:rPr lang="en-US" altLang="zh-CN" sz="1600" dirty="0">
+              <a:rPr lang="zh-CN" altLang="en-US" sz="1600" dirty="0" smtClean="0">
+                <a:solidFill>
+                  <a:schemeClr val="accent1">
+                    <a:lumMod val="50000"/>
+                  </a:schemeClr>
+                </a:solidFill>
+                <a:latin typeface="Abadi MT Condensed Light" charset="0"/>
+                <a:ea typeface="Abadi MT Condensed Light" charset="0"/>
+                <a:cs typeface="Abadi MT Condensed Light" charset="0"/>
+              </a:rPr>
+              <a:t> </a:t>
+            </a:r>
+            <a:r>
+              <a:rPr lang="en-US" altLang="zh-CN" sz="1600" dirty="0" smtClean="0">
                 <a:solidFill>
                   <a:schemeClr val="accent1">
                     <a:lumMod val="50000"/>
@@ -7259,7 +7226,7 @@
               <a:t>for</a:t>
             </a:r>
             <a:r>
-              <a:rPr lang="zh-CN" altLang="en-US" sz="1600" dirty="0">
+              <a:rPr lang="zh-CN" altLang="en-US" sz="1600" dirty="0" smtClean="0">
                 <a:solidFill>
                   <a:schemeClr val="accent1">
                     <a:lumMod val="50000"/>
@@ -7291,6 +7258,32 @@
               <a:buChar char="•"/>
             </a:pPr>
             <a:r>
+              <a:rPr lang="en-US" altLang="zh-CN" sz="1600" dirty="0" smtClean="0">
+                <a:solidFill>
+                  <a:schemeClr val="accent1">
+                    <a:lumMod val="50000"/>
+                  </a:schemeClr>
+                </a:solidFill>
+                <a:latin typeface="Abadi MT Condensed Light" charset="0"/>
+                <a:ea typeface="Abadi MT Condensed Light" charset="0"/>
+                <a:cs typeface="Abadi MT Condensed Light" charset="0"/>
+              </a:rPr>
+              <a:t>Click</a:t>
+            </a:r>
+            <a:r>
+              <a:rPr lang="zh-CN" altLang="en-US" sz="1600" dirty="0" smtClean="0">
+                <a:solidFill>
+                  <a:schemeClr val="accent1">
+                    <a:lumMod val="50000"/>
+                  </a:schemeClr>
+                </a:solidFill>
+                <a:latin typeface="Abadi MT Condensed Light" charset="0"/>
+                <a:ea typeface="Abadi MT Condensed Light" charset="0"/>
+                <a:cs typeface="Abadi MT Condensed Light" charset="0"/>
+              </a:rPr>
+              <a:t> </a:t>
+            </a:r>
+            <a:r>
               <a:rPr lang="en-US" altLang="zh-CN" sz="1600" dirty="0">
                 <a:solidFill>
                   <a:schemeClr val="accent1">
@@ -7301,7 +7294,7 @@
                 <a:ea typeface="Abadi MT Condensed Light" charset="0"/>
                 <a:cs typeface="Abadi MT Condensed Light" charset="0"/>
               </a:rPr>
-              <a:t>Click</a:t>
+              <a:t>dot</a:t>
             </a:r>
             <a:r>
               <a:rPr lang="zh-CN" altLang="en-US" sz="1600" dirty="0">
@@ -7327,7 +7320,7 @@
                 <a:ea typeface="Abadi MT Condensed Light" charset="0"/>
                 <a:cs typeface="Abadi MT Condensed Light" charset="0"/>
               </a:rPr>
-              <a:t>dot</a:t>
+              <a:t>to</a:t>
             </a:r>
             <a:r>
               <a:rPr lang="zh-CN" altLang="en-US" sz="1600" dirty="0">
@@ -7353,7 +7346,7 @@
                 <a:ea typeface="Abadi MT Condensed Light" charset="0"/>
                 <a:cs typeface="Abadi MT Condensed Light" charset="0"/>
               </a:rPr>
-              <a:t>to</a:t>
+              <a:t>jump</a:t>
             </a:r>
             <a:r>
               <a:rPr lang="zh-CN" altLang="en-US" sz="1600" dirty="0">
@@ -7379,7 +7372,7 @@
                 <a:ea typeface="Abadi MT Condensed Light" charset="0"/>
                 <a:cs typeface="Abadi MT Condensed Light" charset="0"/>
               </a:rPr>
-              <a:t>jump</a:t>
+              <a:t>into</a:t>
             </a:r>
             <a:r>
               <a:rPr lang="zh-CN" altLang="en-US" sz="1600" dirty="0">
@@ -7405,7 +7398,7 @@
                 <a:ea typeface="Abadi MT Condensed Light" charset="0"/>
                 <a:cs typeface="Abadi MT Condensed Light" charset="0"/>
               </a:rPr>
-              <a:t>into</a:t>
+              <a:t>building</a:t>
             </a:r>
             <a:r>
               <a:rPr lang="zh-CN" altLang="en-US" sz="1600" dirty="0">
@@ -7421,32 +7414,6 @@
               <a:t> </a:t>
             </a:r>
             <a:r>
-              <a:rPr lang="en-US" altLang="zh-CN" sz="1600" dirty="0">
-                <a:solidFill>
-                  <a:schemeClr val="accent1">
-                    <a:lumMod val="50000"/>
-                  </a:schemeClr>
-                </a:solidFill>
-                <a:latin typeface="Abadi MT Condensed Light" charset="0"/>
-                <a:ea typeface="Abadi MT Condensed Light" charset="0"/>
-                <a:cs typeface="Abadi MT Condensed Light" charset="0"/>
-              </a:rPr>
-              <a:t>building</a:t>
-            </a:r>
-            <a:r>
-              <a:rPr lang="zh-CN" altLang="en-US" sz="1600" dirty="0">
-                <a:solidFill>
-                  <a:schemeClr val="accent1">
-                    <a:lumMod val="50000"/>
-                  </a:schemeClr>
-                </a:solidFill>
-                <a:latin typeface="Abadi MT Condensed Light" charset="0"/>
-                <a:ea typeface="Abadi MT Condensed Light" charset="0"/>
-                <a:cs typeface="Abadi MT Condensed Light" charset="0"/>
-              </a:rPr>
-              <a:t> </a:t>
-            </a:r>
-            <a:r>
               <a:rPr lang="en-US" altLang="zh-CN" sz="1600" dirty="0" smtClean="0">
                 <a:solidFill>
                   <a:schemeClr val="accent1">
@@ -7457,55 +7424,9 @@
                 <a:ea typeface="Abadi MT Condensed Light" charset="0"/>
                 <a:cs typeface="Abadi MT Condensed Light" charset="0"/>
               </a:rPr>
-              <a:t>information-&gt;</a:t>
-            </a:r>
-            <a:r>
-              <a:rPr lang="zh-CN" altLang="en-US" sz="1600" dirty="0" smtClean="0">
-                <a:solidFill>
-                  <a:schemeClr val="accent1">
-                    <a:lumMod val="50000"/>
-                  </a:schemeClr>
-                </a:solidFill>
-                <a:latin typeface="Abadi MT Condensed Light" charset="0"/>
-                <a:ea typeface="Abadi MT Condensed Light" charset="0"/>
-                <a:cs typeface="Abadi MT Condensed Light" charset="0"/>
-              </a:rPr>
-              <a:t> </a:t>
-            </a:r>
-            <a:r>
-              <a:rPr lang="en-US" altLang="zh-CN" sz="1600" dirty="0" smtClean="0">
-                <a:solidFill>
-                  <a:srgbClr val="FF0000"/>
-                </a:solidFill>
-                <a:latin typeface="Abadi MT Condensed Light" charset="0"/>
-                <a:ea typeface="Abadi MT Condensed Light" charset="0"/>
-                <a:cs typeface="Abadi MT Condensed Light" charset="0"/>
-              </a:rPr>
-              <a:t>more</a:t>
-            </a:r>
-            <a:r>
-              <a:rPr lang="zh-CN" altLang="en-US" sz="1600" dirty="0" smtClean="0">
-                <a:solidFill>
-                  <a:srgbClr val="FF0000"/>
-                </a:solidFill>
-                <a:latin typeface="Abadi MT Condensed Light" charset="0"/>
-                <a:ea typeface="Abadi MT Condensed Light" charset="0"/>
-                <a:cs typeface="Abadi MT Condensed Light" charset="0"/>
-              </a:rPr>
-              <a:t> </a:t>
-            </a:r>
-            <a:r>
-              <a:rPr lang="en-US" altLang="zh-CN" sz="1600" dirty="0" smtClean="0">
-                <a:solidFill>
-                  <a:srgbClr val="FF0000"/>
-                </a:solidFill>
-                <a:latin typeface="Abadi MT Condensed Light" charset="0"/>
-                <a:ea typeface="Abadi MT Condensed Light" charset="0"/>
-                <a:cs typeface="Abadi MT Condensed Light" charset="0"/>
-              </a:rPr>
-              <a:t>areas</a:t>
-            </a:r>
-            <a:endParaRPr lang="en-US" altLang="zh-CN" sz="1600" dirty="0">
+              <a:t>information</a:t>
+            </a:r>
+            <a:endParaRPr lang="en-US" altLang="zh-CN" sz="1600" dirty="0" smtClean="0">
               <a:solidFill>
                 <a:srgbClr val="FF0000"/>
               </a:solidFill>
@@ -7516,7 +7437,7 @@
           </a:p>
           <a:p>
             <a:r>
-              <a:rPr lang="en-US" altLang="zh-CN" sz="2000" dirty="0">
+              <a:rPr lang="en-US" altLang="zh-CN" sz="2000" dirty="0" smtClean="0">
                 <a:solidFill>
                   <a:schemeClr val="accent1">
                     <a:lumMod val="50000"/>
@@ -7529,20 +7450,20 @@
               <a:t>Tooltip</a:t>
             </a:r>
             <a:r>
-              <a:rPr lang="zh-CN" altLang="en-US" sz="2000" dirty="0">
-                <a:solidFill>
-                  <a:schemeClr val="accent1">
-                    <a:lumMod val="50000"/>
-                  </a:schemeClr>
-                </a:solidFill>
-                <a:latin typeface="Abadi MT Condensed Light" charset="0"/>
-                <a:ea typeface="Abadi MT Condensed Light" charset="0"/>
-                <a:cs typeface="Abadi MT Condensed Light" charset="0"/>
-              </a:rPr>
-              <a:t> </a:t>
-            </a:r>
-            <a:r>
-              <a:rPr lang="en-US" altLang="zh-CN" sz="2000" dirty="0">
+              <a:rPr lang="zh-CN" altLang="en-US" sz="2000" dirty="0" smtClean="0">
+                <a:solidFill>
+                  <a:schemeClr val="accent1">
+                    <a:lumMod val="50000"/>
+                  </a:schemeClr>
+                </a:solidFill>
+                <a:latin typeface="Abadi MT Condensed Light" charset="0"/>
+                <a:ea typeface="Abadi MT Condensed Light" charset="0"/>
+                <a:cs typeface="Abadi MT Condensed Light" charset="0"/>
+              </a:rPr>
+              <a:t> </a:t>
+            </a:r>
+            <a:r>
+              <a:rPr lang="en-US" altLang="zh-CN" sz="2000" dirty="0" smtClean="0">
                 <a:solidFill>
                   <a:schemeClr val="accent1">
                     <a:lumMod val="50000"/>
@@ -7555,20 +7476,20 @@
               <a:t>for</a:t>
             </a:r>
             <a:r>
-              <a:rPr lang="zh-CN" altLang="en-US" sz="2000" dirty="0">
-                <a:solidFill>
-                  <a:schemeClr val="accent1">
-                    <a:lumMod val="50000"/>
-                  </a:schemeClr>
-                </a:solidFill>
-                <a:latin typeface="Abadi MT Condensed Light" charset="0"/>
-                <a:ea typeface="Abadi MT Condensed Light" charset="0"/>
-                <a:cs typeface="Abadi MT Condensed Light" charset="0"/>
-              </a:rPr>
-              <a:t> </a:t>
-            </a:r>
-            <a:r>
-              <a:rPr lang="en-US" altLang="zh-CN" sz="2000" dirty="0">
+              <a:rPr lang="zh-CN" altLang="en-US" sz="2000" dirty="0" smtClean="0">
+                <a:solidFill>
+                  <a:schemeClr val="accent1">
+                    <a:lumMod val="50000"/>
+                  </a:schemeClr>
+                </a:solidFill>
+                <a:latin typeface="Abadi MT Condensed Light" charset="0"/>
+                <a:ea typeface="Abadi MT Condensed Light" charset="0"/>
+                <a:cs typeface="Abadi MT Condensed Light" charset="0"/>
+              </a:rPr>
+              <a:t> </a:t>
+            </a:r>
+            <a:r>
+              <a:rPr lang="en-US" altLang="zh-CN" sz="2000" dirty="0" smtClean="0">
                 <a:solidFill>
                   <a:schemeClr val="accent1">
                     <a:lumMod val="50000"/>
@@ -7581,7 +7502,7 @@
               <a:t>building</a:t>
             </a:r>
             <a:r>
-              <a:rPr lang="zh-CN" altLang="en-US" sz="2000" dirty="0">
+              <a:rPr lang="zh-CN" altLang="en-US" sz="2000" dirty="0" smtClean="0">
                 <a:solidFill>
                   <a:schemeClr val="accent1">
                     <a:lumMod val="50000"/>

</xml_diff>